<commit_message>
no bugs, but not yet checked correctness
</commit_message>
<xml_diff>
--- a/doc/call_graph.pptx
+++ b/doc/call_graph.pptx
@@ -4947,7 +4947,7 @@
                   <a:schemeClr val="tx1"/>
                 </a:solidFill>
               </a:rPr>
-              <a:t>prov_record_arg</a:t>
+              <a:t>record_arg</a:t>
             </a:r>
           </a:p>
         </p:txBody>
@@ -5043,7 +5043,7 @@
                   <a:schemeClr val="tx1"/>
                 </a:solidFill>
               </a:rPr>
-              <a:t>prov_record_args</a:t>
+              <a:t>record_args</a:t>
             </a:r>
           </a:p>
         </p:txBody>
@@ -5621,7 +5621,7 @@
                   <a:schemeClr val="tx1"/>
                 </a:solidFill>
               </a:rPr>
-              <a:t>inode_provenance</a:t>
+              <a:t>get_inode_provenance</a:t>
             </a:r>
           </a:p>
         </p:txBody>
@@ -5769,8 +5769,8 @@
         </p:nvSpPr>
         <p:spPr>
           <a:xfrm>
-            <a:off x="4808572" y="1429040"/>
-            <a:ext cx="1299256" cy="132492"/>
+            <a:off x="4777397" y="1439710"/>
+            <a:ext cx="1344469" cy="120916"/>
           </a:xfrm>
           <a:prstGeom prst="rect">
             <a:avLst/>
@@ -5804,7 +5804,7 @@
                   <a:schemeClr val="tx1"/>
                 </a:solidFill>
               </a:rPr>
-              <a:t>dentry_provenance</a:t>
+              <a:t>get_dentry_provenance</a:t>
             </a:r>
           </a:p>
         </p:txBody>
@@ -5819,6 +5819,7 @@
             </a:extLst>
           </p:cNvPr>
           <p:cNvCxnSpPr>
+            <a:cxnSpLocks/>
             <a:stCxn id="285" idx="0"/>
             <a:endCxn id="272" idx="2"/>
           </p:cNvCxnSpPr>
@@ -5826,8 +5827,8 @@
         </p:nvCxnSpPr>
         <p:spPr>
           <a:xfrm flipV="1">
-            <a:off x="5458200" y="1063002"/>
-            <a:ext cx="0" cy="366038"/>
+            <a:off x="5449632" y="1063002"/>
+            <a:ext cx="8568" cy="376708"/>
           </a:xfrm>
           <a:prstGeom prst="straightConnector1">
             <a:avLst/>
@@ -5900,7 +5901,7 @@
                   <a:schemeClr val="tx1"/>
                 </a:solidFill>
               </a:rPr>
-              <a:t>file_provenance</a:t>
+              <a:t>get_file_provenance</a:t>
             </a:r>
           </a:p>
         </p:txBody>
@@ -6011,15 +6012,16 @@
             </a:extLst>
           </p:cNvPr>
           <p:cNvCxnSpPr>
+            <a:cxnSpLocks/>
             <a:stCxn id="291" idx="0"/>
             <a:endCxn id="285" idx="2"/>
           </p:cNvCxnSpPr>
           <p:nvPr/>
         </p:nvCxnSpPr>
         <p:spPr>
-          <a:xfrm flipV="1">
-            <a:off x="5458200" y="1561532"/>
-            <a:ext cx="0" cy="310426"/>
+          <a:xfrm flipH="1" flipV="1">
+            <a:off x="5449632" y="1560626"/>
+            <a:ext cx="8568" cy="311332"/>
           </a:xfrm>
           <a:prstGeom prst="straightConnector1">
             <a:avLst/>
@@ -6249,8 +6251,8 @@
         </p:nvSpPr>
         <p:spPr>
           <a:xfrm>
-            <a:off x="7888507" y="1429039"/>
-            <a:ext cx="1476758" cy="132492"/>
+            <a:off x="7888506" y="1429039"/>
+            <a:ext cx="1721633" cy="129101"/>
           </a:xfrm>
           <a:prstGeom prst="rect">
             <a:avLst/>
@@ -6284,7 +6286,7 @@
                   <a:schemeClr val="tx1"/>
                 </a:solidFill>
               </a:rPr>
-              <a:t>socket_inode_provenance</a:t>
+              <a:t>get_socket_inode_provenance</a:t>
             </a:r>
           </a:p>
         </p:txBody>
@@ -6299,6 +6301,7 @@
             </a:extLst>
           </p:cNvPr>
           <p:cNvCxnSpPr>
+            <a:cxnSpLocks/>
             <a:stCxn id="302" idx="0"/>
             <a:endCxn id="272" idx="2"/>
           </p:cNvCxnSpPr>
@@ -6306,8 +6309,8 @@
         </p:nvCxnSpPr>
         <p:spPr>
           <a:xfrm rot="16200000" flipV="1">
-            <a:off x="6859525" y="-338322"/>
-            <a:ext cx="366037" cy="3168686"/>
+            <a:off x="6920744" y="-399541"/>
+            <a:ext cx="366037" cy="3291123"/>
           </a:xfrm>
           <a:prstGeom prst="bentConnector3">
             <a:avLst/>
@@ -6345,8 +6348,8 @@
         </p:nvSpPr>
         <p:spPr>
           <a:xfrm>
-            <a:off x="6844089" y="1938204"/>
-            <a:ext cx="1299256" cy="132492"/>
+            <a:off x="6844089" y="2023308"/>
+            <a:ext cx="1446385" cy="140125"/>
           </a:xfrm>
           <a:prstGeom prst="rect">
             <a:avLst/>
@@ -6380,7 +6383,7 @@
                   <a:schemeClr val="tx1"/>
                 </a:solidFill>
               </a:rPr>
-              <a:t>sk_inode_provenance</a:t>
+              <a:t>get_sk_inode_provenance</a:t>
             </a:r>
           </a:p>
         </p:txBody>
@@ -6395,6 +6398,7 @@
             </a:extLst>
           </p:cNvPr>
           <p:cNvCxnSpPr>
+            <a:cxnSpLocks/>
             <a:stCxn id="305" idx="0"/>
             <a:endCxn id="302" idx="2"/>
           </p:cNvCxnSpPr>
@@ -6402,8 +6406,8 @@
         </p:nvCxnSpPr>
         <p:spPr>
           <a:xfrm rot="5400000" flipH="1" flipV="1">
-            <a:off x="7871965" y="1183284"/>
-            <a:ext cx="376673" cy="1133169"/>
+            <a:off x="7925718" y="1199704"/>
+            <a:ext cx="465168" cy="1182041"/>
           </a:xfrm>
           <a:prstGeom prst="bentConnector3">
             <a:avLst/>
@@ -6476,7 +6480,7 @@
                   <a:schemeClr val="tx1"/>
                 </a:solidFill>
               </a:rPr>
-              <a:t>provenance_record_address</a:t>
+              <a:t>record_address</a:t>
             </a:r>
           </a:p>
         </p:txBody>
@@ -6572,7 +6576,7 @@
                   <a:schemeClr val="tx1"/>
                 </a:solidFill>
               </a:rPr>
-              <a:t>provenance_packet_content</a:t>
+              <a:t>record_packet_content</a:t>
             </a:r>
           </a:p>
         </p:txBody>
@@ -7594,7 +7598,7 @@
             <a:pPr algn="ctr"/>
             <a:r>
               <a:rPr lang="en-US" sz="900" dirty="0"/>
-              <a:t>5</a:t>
+              <a:t>X</a:t>
             </a:r>
           </a:p>
         </p:txBody>
@@ -7741,7 +7745,7 @@
             <a:pPr algn="ctr"/>
             <a:r>
               <a:rPr lang="en-US" sz="900" dirty="0"/>
-              <a:t>6</a:t>
+              <a:t>F</a:t>
             </a:r>
           </a:p>
         </p:txBody>
@@ -8152,7 +8156,7 @@
         </p:nvSpPr>
         <p:spPr>
           <a:xfrm>
-            <a:off x="6758258" y="1858577"/>
+            <a:off x="6756822" y="1933769"/>
             <a:ext cx="153110" cy="153110"/>
           </a:xfrm>
           <a:prstGeom prst="ellipse">
@@ -8209,6 +8213,50 @@
           <a:prstGeom prst="bentConnector3">
             <a:avLst>
               <a:gd name="adj1" fmla="val 69829"/>
+            </a:avLst>
+          </a:prstGeom>
+          <a:ln>
+            <a:tailEnd type="triangle"/>
+          </a:ln>
+        </p:spPr>
+        <p:style>
+          <a:lnRef idx="1">
+            <a:schemeClr val="accent1"/>
+          </a:lnRef>
+          <a:fillRef idx="0">
+            <a:schemeClr val="accent1"/>
+          </a:fillRef>
+          <a:effectRef idx="0">
+            <a:schemeClr val="accent1"/>
+          </a:effectRef>
+          <a:fontRef idx="minor">
+            <a:schemeClr val="tx1"/>
+          </a:fontRef>
+        </p:style>
+      </p:cxnSp>
+      <p:cxnSp>
+        <p:nvCxnSpPr>
+          <p:cNvPr id="16" name="Elbow Connector 15">
+            <a:extLst>
+              <a:ext uri="{FF2B5EF4-FFF2-40B4-BE49-F238E27FC236}">
+                <a16:creationId xmlns:a16="http://schemas.microsoft.com/office/drawing/2014/main" id="{F6D703DA-9374-7546-9FE2-A0E34C3EC4C0}"/>
+              </a:ext>
+            </a:extLst>
+          </p:cNvPr>
+          <p:cNvCxnSpPr>
+            <a:cxnSpLocks/>
+            <a:stCxn id="200" idx="3"/>
+          </p:cNvCxnSpPr>
+          <p:nvPr/>
+        </p:nvCxnSpPr>
+        <p:spPr>
+          <a:xfrm flipV="1">
+            <a:off x="3476095" y="1558337"/>
+            <a:ext cx="3020136" cy="132260"/>
+          </a:xfrm>
+          <a:prstGeom prst="bentConnector3">
+            <a:avLst>
+              <a:gd name="adj1" fmla="val 100224"/>
             </a:avLst>
           </a:prstGeom>
           <a:ln>

</xml_diff>